<commit_message>
added in alcohol vs. happiness slides and cleaned up income inequality slides
</commit_message>
<xml_diff>
--- a/For Submittal/DrinkandBeHappyFinal.pptx
+++ b/For Submittal/DrinkandBeHappyFinal.pptx
@@ -5,7 +5,7 @@
     <p:sldMasterId id="2147483648" r:id="rId1"/>
   </p:sldMasterIdLst>
   <p:notesMasterIdLst>
-    <p:notesMasterId r:id="rId18"/>
+    <p:notesMasterId r:id="rId19"/>
   </p:notesMasterIdLst>
   <p:sldIdLst>
     <p:sldId id="263" r:id="rId2"/>
@@ -13,7 +13,7 @@
     <p:sldId id="270" r:id="rId4"/>
     <p:sldId id="273" r:id="rId5"/>
     <p:sldId id="264" r:id="rId6"/>
-    <p:sldId id="265" r:id="rId7"/>
+    <p:sldId id="286" r:id="rId7"/>
     <p:sldId id="272" r:id="rId8"/>
     <p:sldId id="276" r:id="rId9"/>
     <p:sldId id="275" r:id="rId10"/>
@@ -22,8 +22,9 @@
     <p:sldId id="280" r:id="rId13"/>
     <p:sldId id="266" r:id="rId14"/>
     <p:sldId id="267" r:id="rId15"/>
-    <p:sldId id="283" r:id="rId16"/>
-    <p:sldId id="285" r:id="rId17"/>
+    <p:sldId id="287" r:id="rId16"/>
+    <p:sldId id="283" r:id="rId17"/>
+    <p:sldId id="285" r:id="rId18"/>
   </p:sldIdLst>
   <p:sldSz cx="12192000" cy="6858000"/>
   <p:notesSz cx="6858000" cy="9144000"/>
@@ -6353,7 +6354,7 @@
                   </a:schemeClr>
                 </a:solidFill>
               </a:rPr>
-              <a:t>What else did we find?</a:t>
+              <a:t>What else did we find? Maybe a need for further digging…</a:t>
             </a:r>
             <a:endParaRPr lang="en-US" b="1" dirty="0"/>
           </a:p>
@@ -6374,7 +6375,7 @@
         <p:spPr>
           <a:xfrm>
             <a:off x="3000801" y="1509605"/>
-            <a:ext cx="8614834" cy="4247317"/>
+            <a:ext cx="8614834" cy="923330"/>
           </a:xfrm>
           <a:prstGeom prst="rect">
             <a:avLst/>
@@ -6392,40 +6393,6 @@
             </a:pPr>
             <a:r>
               <a:rPr lang="en-US" dirty="0"/>
-              <a:t>Which countries have the most income inequality?</a:t>
-            </a:r>
-          </a:p>
-          <a:p>
-            <a:pPr marL="742950" lvl="1" indent="-285750">
-              <a:buFont typeface="Arial" panose="020B0604020202020204" pitchFamily="34" charset="0"/>
-              <a:buChar char="•"/>
-            </a:pPr>
-            <a:r>
-              <a:rPr lang="en-US" dirty="0"/>
-              <a:t>South Africa has highest instance of GINI coefficient, but South America appears to have the highest concentration of income inequality, with countries such as Honduras, Brazil, Colombia, Paraguay, and making the top 10.</a:t>
-            </a:r>
-          </a:p>
-          <a:p>
-            <a:pPr marL="742950" lvl="1" indent="-285750">
-              <a:buFont typeface="Arial" panose="020B0604020202020204" pitchFamily="34" charset="0"/>
-              <a:buChar char="•"/>
-            </a:pPr>
-            <a:r>
-              <a:rPr lang="en-US" dirty="0"/>
-              <a:t>Countries with increased income equality were primarily located in Europe, with 4 of the 10 lowest GINI coefficient countries also being 4 of the 10 happiest nations.</a:t>
-            </a:r>
-            <a:endParaRPr lang="en-US" sz="2000" dirty="0">
-              <a:latin typeface="Calibri" panose="020F0502020204030204" pitchFamily="34" charset="0"/>
-              <a:cs typeface="Times New Roman" panose="02020603050405020304" pitchFamily="18" charset="0"/>
-            </a:endParaRPr>
-          </a:p>
-          <a:p>
-            <a:pPr marL="285750" lvl="0" indent="-285750">
-              <a:buFont typeface="Arial" panose="020B0604020202020204" pitchFamily="34" charset="0"/>
-              <a:buChar char="•"/>
-            </a:pPr>
-            <a:r>
-              <a:rPr lang="en-US" dirty="0"/>
               <a:t>Is there a correlation between alcohol consumption and happiness?</a:t>
             </a:r>
           </a:p>
@@ -6437,46 +6404,6 @@
             <a:r>
               <a:rPr lang="en-US" dirty="0"/>
               <a:t>The data doesn’t suggest that there is a correlation between alcohol consumption and happiness. The data appears to be randomly distributed.</a:t>
-            </a:r>
-          </a:p>
-          <a:p>
-            <a:pPr marL="285750" lvl="0" indent="-285750">
-              <a:buFont typeface="Arial" panose="020B0604020202020204" pitchFamily="34" charset="0"/>
-              <a:buChar char="•"/>
-            </a:pPr>
-            <a:r>
-              <a:rPr lang="en-US" dirty="0"/>
-              <a:t>Is there a correlation between alcohol consumption and income inequality?</a:t>
-            </a:r>
-          </a:p>
-          <a:p>
-            <a:pPr marL="742950" lvl="1" indent="-285750">
-              <a:buFont typeface="Arial" panose="020B0604020202020204" pitchFamily="34" charset="0"/>
-              <a:buChar char="•"/>
-            </a:pPr>
-            <a:r>
-              <a:rPr lang="en-US" dirty="0"/>
-              <a:t>There appears to be a trend where reduced income inequality leads to higher alcohol consumption.</a:t>
-            </a:r>
-          </a:p>
-          <a:p>
-            <a:pPr marL="285750" lvl="0" indent="-285750">
-              <a:buFont typeface="Arial" panose="020B0604020202020204" pitchFamily="34" charset="0"/>
-              <a:buChar char="•"/>
-            </a:pPr>
-            <a:r>
-              <a:rPr lang="en-US" dirty="0"/>
-              <a:t>Is there a correlation between income inequality and happiness?</a:t>
-            </a:r>
-          </a:p>
-          <a:p>
-            <a:pPr marL="742950" lvl="1" indent="-285750">
-              <a:buFont typeface="Arial" panose="020B0604020202020204" pitchFamily="34" charset="0"/>
-              <a:buChar char="•"/>
-            </a:pPr>
-            <a:r>
-              <a:rPr lang="en-US" dirty="0"/>
-              <a:t>The data shows a seemingly significant trend indicating that reduced income inequality correlates with increased happiness.</a:t>
             </a:r>
           </a:p>
         </p:txBody>
@@ -6686,6 +6613,36 @@
           </a:p>
         </p:txBody>
       </p:sp>
+      <p:pic>
+        <p:nvPicPr>
+          <p:cNvPr id="4" name="Picture 3">
+            <a:extLst>
+              <a:ext uri="{FF2B5EF4-FFF2-40B4-BE49-F238E27FC236}">
+                <a16:creationId xmlns:a16="http://schemas.microsoft.com/office/drawing/2014/main" id="{FF9DB451-90DA-48A7-9900-504070FCC080}"/>
+              </a:ext>
+            </a:extLst>
+          </p:cNvPr>
+          <p:cNvPicPr>
+            <a:picLocks noChangeAspect="1"/>
+          </p:cNvPicPr>
+          <p:nvPr/>
+        </p:nvPicPr>
+        <p:blipFill>
+          <a:blip r:embed="rId2"/>
+          <a:stretch>
+            <a:fillRect/>
+          </a:stretch>
+        </p:blipFill>
+        <p:spPr>
+          <a:xfrm>
+            <a:off x="4194928" y="2357314"/>
+            <a:ext cx="5948313" cy="3830743"/>
+          </a:xfrm>
+          <a:prstGeom prst="rect">
+            <a:avLst/>
+          </a:prstGeom>
+        </p:spPr>
+      </p:pic>
     </p:spTree>
     <p:extLst>
       <p:ext uri="{BB962C8B-B14F-4D97-AF65-F5344CB8AC3E}">
@@ -8993,6 +8950,884 @@
         </p:nvSpPr>
         <p:spPr>
           <a:xfrm>
+            <a:off x="2753395" y="160374"/>
+            <a:ext cx="6513153" cy="597617"/>
+          </a:xfrm>
+          <a:prstGeom prst="rect">
+            <a:avLst/>
+          </a:prstGeom>
+        </p:spPr>
+        <p:txBody>
+          <a:bodyPr vert="horz" lIns="91440" tIns="45720" rIns="91440" bIns="45720" rtlCol="0" anchor="b">
+            <a:normAutofit fontScale="70000" lnSpcReduction="20000"/>
+          </a:bodyPr>
+          <a:lstStyle>
+            <a:lvl1pPr marL="0" indent="0" algn="l" defTabSz="914400" rtl="0" eaLnBrk="1" latinLnBrk="0" hangingPunct="1">
+              <a:lnSpc>
+                <a:spcPct val="90000"/>
+              </a:lnSpc>
+              <a:spcBef>
+                <a:spcPts val="1000"/>
+              </a:spcBef>
+              <a:buFont typeface="Arial" panose="020B0604020202020204" pitchFamily="34" charset="0"/>
+              <a:buNone/>
+              <a:defRPr sz="2400" b="1" kern="1200">
+                <a:solidFill>
+                  <a:schemeClr val="tx1"/>
+                </a:solidFill>
+                <a:latin typeface="+mn-lt"/>
+                <a:ea typeface="+mn-ea"/>
+                <a:cs typeface="+mn-cs"/>
+              </a:defRPr>
+            </a:lvl1pPr>
+            <a:lvl2pPr marL="457200" indent="0" algn="l" defTabSz="914400" rtl="0" eaLnBrk="1" latinLnBrk="0" hangingPunct="1">
+              <a:lnSpc>
+                <a:spcPct val="90000"/>
+              </a:lnSpc>
+              <a:spcBef>
+                <a:spcPts val="500"/>
+              </a:spcBef>
+              <a:buFont typeface="Arial" panose="020B0604020202020204" pitchFamily="34" charset="0"/>
+              <a:buNone/>
+              <a:defRPr sz="2000" b="1" kern="1200">
+                <a:solidFill>
+                  <a:schemeClr val="tx1"/>
+                </a:solidFill>
+                <a:latin typeface="+mn-lt"/>
+                <a:ea typeface="+mn-ea"/>
+                <a:cs typeface="+mn-cs"/>
+              </a:defRPr>
+            </a:lvl2pPr>
+            <a:lvl3pPr marL="914400" indent="0" algn="l" defTabSz="914400" rtl="0" eaLnBrk="1" latinLnBrk="0" hangingPunct="1">
+              <a:lnSpc>
+                <a:spcPct val="90000"/>
+              </a:lnSpc>
+              <a:spcBef>
+                <a:spcPts val="500"/>
+              </a:spcBef>
+              <a:buFont typeface="Arial" panose="020B0604020202020204" pitchFamily="34" charset="0"/>
+              <a:buNone/>
+              <a:defRPr sz="1800" b="1" kern="1200">
+                <a:solidFill>
+                  <a:schemeClr val="tx1"/>
+                </a:solidFill>
+                <a:latin typeface="+mn-lt"/>
+                <a:ea typeface="+mn-ea"/>
+                <a:cs typeface="+mn-cs"/>
+              </a:defRPr>
+            </a:lvl3pPr>
+            <a:lvl4pPr marL="1371600" indent="0" algn="l" defTabSz="914400" rtl="0" eaLnBrk="1" latinLnBrk="0" hangingPunct="1">
+              <a:lnSpc>
+                <a:spcPct val="90000"/>
+              </a:lnSpc>
+              <a:spcBef>
+                <a:spcPts val="500"/>
+              </a:spcBef>
+              <a:buFont typeface="Arial" panose="020B0604020202020204" pitchFamily="34" charset="0"/>
+              <a:buNone/>
+              <a:defRPr sz="1600" b="1" kern="1200">
+                <a:solidFill>
+                  <a:schemeClr val="tx1"/>
+                </a:solidFill>
+                <a:latin typeface="+mn-lt"/>
+                <a:ea typeface="+mn-ea"/>
+                <a:cs typeface="+mn-cs"/>
+              </a:defRPr>
+            </a:lvl4pPr>
+            <a:lvl5pPr marL="1828800" indent="0" algn="l" defTabSz="914400" rtl="0" eaLnBrk="1" latinLnBrk="0" hangingPunct="1">
+              <a:lnSpc>
+                <a:spcPct val="90000"/>
+              </a:lnSpc>
+              <a:spcBef>
+                <a:spcPts val="500"/>
+              </a:spcBef>
+              <a:buFont typeface="Arial" panose="020B0604020202020204" pitchFamily="34" charset="0"/>
+              <a:buNone/>
+              <a:defRPr sz="1600" b="1" kern="1200">
+                <a:solidFill>
+                  <a:schemeClr val="tx1"/>
+                </a:solidFill>
+                <a:latin typeface="+mn-lt"/>
+                <a:ea typeface="+mn-ea"/>
+                <a:cs typeface="+mn-cs"/>
+              </a:defRPr>
+            </a:lvl5pPr>
+            <a:lvl6pPr marL="2286000" indent="0" algn="l" defTabSz="914400" rtl="0" eaLnBrk="1" latinLnBrk="0" hangingPunct="1">
+              <a:lnSpc>
+                <a:spcPct val="90000"/>
+              </a:lnSpc>
+              <a:spcBef>
+                <a:spcPts val="500"/>
+              </a:spcBef>
+              <a:buFont typeface="Arial" panose="020B0604020202020204" pitchFamily="34" charset="0"/>
+              <a:buNone/>
+              <a:defRPr sz="1600" b="1" kern="1200">
+                <a:solidFill>
+                  <a:schemeClr val="tx1"/>
+                </a:solidFill>
+                <a:latin typeface="+mn-lt"/>
+                <a:ea typeface="+mn-ea"/>
+                <a:cs typeface="+mn-cs"/>
+              </a:defRPr>
+            </a:lvl6pPr>
+            <a:lvl7pPr marL="2743200" indent="0" algn="l" defTabSz="914400" rtl="0" eaLnBrk="1" latinLnBrk="0" hangingPunct="1">
+              <a:lnSpc>
+                <a:spcPct val="90000"/>
+              </a:lnSpc>
+              <a:spcBef>
+                <a:spcPts val="500"/>
+              </a:spcBef>
+              <a:buFont typeface="Arial" panose="020B0604020202020204" pitchFamily="34" charset="0"/>
+              <a:buNone/>
+              <a:defRPr sz="1600" b="1" kern="1200">
+                <a:solidFill>
+                  <a:schemeClr val="tx1"/>
+                </a:solidFill>
+                <a:latin typeface="+mn-lt"/>
+                <a:ea typeface="+mn-ea"/>
+                <a:cs typeface="+mn-cs"/>
+              </a:defRPr>
+            </a:lvl7pPr>
+            <a:lvl8pPr marL="3200400" indent="0" algn="l" defTabSz="914400" rtl="0" eaLnBrk="1" latinLnBrk="0" hangingPunct="1">
+              <a:lnSpc>
+                <a:spcPct val="90000"/>
+              </a:lnSpc>
+              <a:spcBef>
+                <a:spcPts val="500"/>
+              </a:spcBef>
+              <a:buFont typeface="Arial" panose="020B0604020202020204" pitchFamily="34" charset="0"/>
+              <a:buNone/>
+              <a:defRPr sz="1600" b="1" kern="1200">
+                <a:solidFill>
+                  <a:schemeClr val="tx1"/>
+                </a:solidFill>
+                <a:latin typeface="+mn-lt"/>
+                <a:ea typeface="+mn-ea"/>
+                <a:cs typeface="+mn-cs"/>
+              </a:defRPr>
+            </a:lvl8pPr>
+            <a:lvl9pPr marL="3657600" indent="0" algn="l" defTabSz="914400" rtl="0" eaLnBrk="1" latinLnBrk="0" hangingPunct="1">
+              <a:lnSpc>
+                <a:spcPct val="90000"/>
+              </a:lnSpc>
+              <a:spcBef>
+                <a:spcPts val="500"/>
+              </a:spcBef>
+              <a:buFont typeface="Arial" panose="020B0604020202020204" pitchFamily="34" charset="0"/>
+              <a:buNone/>
+              <a:defRPr sz="1600" b="1" kern="1200">
+                <a:solidFill>
+                  <a:schemeClr val="tx1"/>
+                </a:solidFill>
+                <a:latin typeface="+mn-lt"/>
+                <a:ea typeface="+mn-ea"/>
+                <a:cs typeface="+mn-cs"/>
+              </a:defRPr>
+            </a:lvl9pPr>
+          </a:lstStyle>
+          <a:p>
+            <a:pPr algn="r"/>
+            <a:r>
+              <a:rPr lang="en-US" sz="5400" dirty="0">
+                <a:solidFill>
+                  <a:srgbClr val="000000"/>
+                </a:solidFill>
+              </a:rPr>
+              <a:t>Conclusions: Income Inequality</a:t>
+            </a:r>
+          </a:p>
+        </p:txBody>
+      </p:sp>
+      <p:sp>
+        <p:nvSpPr>
+          <p:cNvPr id="3" name="Rectangle 2">
+            <a:extLst>
+              <a:ext uri="{FF2B5EF4-FFF2-40B4-BE49-F238E27FC236}">
+                <a16:creationId xmlns:a16="http://schemas.microsoft.com/office/drawing/2014/main" id="{9E5589BA-3D64-4F97-9BD6-283610F19E74}"/>
+              </a:ext>
+            </a:extLst>
+          </p:cNvPr>
+          <p:cNvSpPr/>
+          <p:nvPr/>
+        </p:nvSpPr>
+        <p:spPr>
+          <a:xfrm>
+            <a:off x="2837432" y="1094529"/>
+            <a:ext cx="8396140" cy="2031325"/>
+          </a:xfrm>
+          <a:prstGeom prst="rect">
+            <a:avLst/>
+          </a:prstGeom>
+        </p:spPr>
+        <p:txBody>
+          <a:bodyPr wrap="square">
+            <a:spAutoFit/>
+          </a:bodyPr>
+          <a:lstStyle/>
+          <a:p>
+            <a:pPr marL="285750" lvl="0" indent="-285750">
+              <a:buFont typeface="Arial" panose="020B0604020202020204" pitchFamily="34" charset="0"/>
+              <a:buChar char="•"/>
+            </a:pPr>
+            <a:r>
+              <a:rPr lang="en-US" dirty="0"/>
+              <a:t>Which countries have the most income inequality?</a:t>
+            </a:r>
+          </a:p>
+          <a:p>
+            <a:pPr marL="742950" lvl="1" indent="-285750">
+              <a:buFont typeface="Arial" panose="020B0604020202020204" pitchFamily="34" charset="0"/>
+              <a:buChar char="•"/>
+            </a:pPr>
+            <a:r>
+              <a:rPr lang="en-US" dirty="0"/>
+              <a:t>South Africa has highest instance of GINI coefficient, but South America appears to have the highest concentration of income inequality, with countries such as Honduras, Brazil, Colombia, Paraguay, and making the top 10.</a:t>
+            </a:r>
+          </a:p>
+          <a:p>
+            <a:pPr marL="742950" lvl="1" indent="-285750">
+              <a:buFont typeface="Arial" panose="020B0604020202020204" pitchFamily="34" charset="0"/>
+              <a:buChar char="•"/>
+            </a:pPr>
+            <a:r>
+              <a:rPr lang="en-US" dirty="0"/>
+              <a:t>Countries with increased income equality were primarily located in Europe, with 4 of the 10 lowest GINI coefficient countries also being 4 of the 10 happiest nations.</a:t>
+            </a:r>
+            <a:endParaRPr lang="en-US" sz="2000" dirty="0">
+              <a:latin typeface="Calibri" panose="020F0502020204030204" pitchFamily="34" charset="0"/>
+              <a:cs typeface="Times New Roman" panose="02020603050405020304" pitchFamily="18" charset="0"/>
+            </a:endParaRPr>
+          </a:p>
+        </p:txBody>
+      </p:sp>
+      <p:sp>
+        <p:nvSpPr>
+          <p:cNvPr id="2" name="Rectangle 1">
+            <a:extLst>
+              <a:ext uri="{FF2B5EF4-FFF2-40B4-BE49-F238E27FC236}">
+                <a16:creationId xmlns:a16="http://schemas.microsoft.com/office/drawing/2014/main" id="{C09CEBA9-F75F-42F1-A233-E969CF57E027}"/>
+              </a:ext>
+            </a:extLst>
+          </p:cNvPr>
+          <p:cNvSpPr/>
+          <p:nvPr/>
+        </p:nvSpPr>
+        <p:spPr>
+          <a:xfrm>
+            <a:off x="3020332" y="3094697"/>
+            <a:ext cx="8018455" cy="923330"/>
+          </a:xfrm>
+          <a:prstGeom prst="rect">
+            <a:avLst/>
+          </a:prstGeom>
+        </p:spPr>
+        <p:txBody>
+          <a:bodyPr wrap="square">
+            <a:spAutoFit/>
+          </a:bodyPr>
+          <a:lstStyle/>
+          <a:p>
+            <a:pPr lvl="0"/>
+            <a:r>
+              <a:rPr lang="en-US" dirty="0"/>
+              <a:t>Is there a correlation between income inequality and happiness?</a:t>
+            </a:r>
+          </a:p>
+          <a:p>
+            <a:pPr marL="742950" lvl="1" indent="-285750">
+              <a:buFont typeface="Arial" panose="020B0604020202020204" pitchFamily="34" charset="0"/>
+              <a:buChar char="•"/>
+            </a:pPr>
+            <a:r>
+              <a:rPr lang="en-US" dirty="0"/>
+              <a:t>The data shows a seemingly significant trend indicating that reduced income inequality correlates with increased happiness.</a:t>
+            </a:r>
+          </a:p>
+        </p:txBody>
+      </p:sp>
+      <p:sp>
+        <p:nvSpPr>
+          <p:cNvPr id="4" name="Rectangle 3">
+            <a:extLst>
+              <a:ext uri="{FF2B5EF4-FFF2-40B4-BE49-F238E27FC236}">
+                <a16:creationId xmlns:a16="http://schemas.microsoft.com/office/drawing/2014/main" id="{20AE3492-C2AA-450F-89F9-1D5FF24B402C}"/>
+              </a:ext>
+            </a:extLst>
+          </p:cNvPr>
+          <p:cNvSpPr/>
+          <p:nvPr/>
+        </p:nvSpPr>
+        <p:spPr>
+          <a:xfrm>
+            <a:off x="3020332" y="4110360"/>
+            <a:ext cx="7616534" cy="923330"/>
+          </a:xfrm>
+          <a:prstGeom prst="rect">
+            <a:avLst/>
+          </a:prstGeom>
+        </p:spPr>
+        <p:txBody>
+          <a:bodyPr wrap="square">
+            <a:spAutoFit/>
+          </a:bodyPr>
+          <a:lstStyle/>
+          <a:p>
+            <a:pPr lvl="0"/>
+            <a:r>
+              <a:rPr lang="en-US" dirty="0"/>
+              <a:t>Is there a correlation between alcohol consumption and income inequality?</a:t>
+            </a:r>
+          </a:p>
+          <a:p>
+            <a:pPr marL="742950" lvl="1" indent="-285750">
+              <a:buFont typeface="Arial" panose="020B0604020202020204" pitchFamily="34" charset="0"/>
+              <a:buChar char="•"/>
+            </a:pPr>
+            <a:r>
+              <a:rPr lang="en-US" dirty="0"/>
+              <a:t>There appears to be a trend where reduced income inequality leads to higher alcohol consumption.</a:t>
+            </a:r>
+          </a:p>
+        </p:txBody>
+      </p:sp>
+    </p:spTree>
+    <p:extLst>
+      <p:ext uri="{BB962C8B-B14F-4D97-AF65-F5344CB8AC3E}">
+        <p14:creationId xmlns:p14="http://schemas.microsoft.com/office/powerpoint/2010/main" val="3086694136"/>
+      </p:ext>
+    </p:extLst>
+  </p:cSld>
+  <p:clrMapOvr>
+    <a:masterClrMapping/>
+  </p:clrMapOvr>
+</p:sld>
+</file>
+
+<file path=ppt/slides/slide16.xml><?xml version="1.0" encoding="utf-8"?>
+<p:sld xmlns:a="http://schemas.openxmlformats.org/drawingml/2006/main" xmlns:r="http://schemas.openxmlformats.org/officeDocument/2006/relationships" xmlns:p="http://schemas.openxmlformats.org/presentationml/2006/main">
+  <p:cSld>
+    <p:bg>
+      <p:bgPr>
+        <a:solidFill>
+          <a:srgbClr val="542C39"/>
+        </a:solidFill>
+        <a:effectLst/>
+      </p:bgPr>
+    </p:bg>
+    <p:spTree>
+      <p:nvGrpSpPr>
+        <p:cNvPr id="1" name=""/>
+        <p:cNvGrpSpPr/>
+        <p:nvPr/>
+      </p:nvGrpSpPr>
+      <p:grpSpPr>
+        <a:xfrm>
+          <a:off x="0" y="0"/>
+          <a:ext cx="0" cy="0"/>
+          <a:chOff x="0" y="0"/>
+          <a:chExt cx="0" cy="0"/>
+        </a:xfrm>
+      </p:grpSpPr>
+      <p:sp>
+        <p:nvSpPr>
+          <p:cNvPr id="18" name="Rectangle 14">
+            <a:extLst>
+              <a:ext uri="{FF2B5EF4-FFF2-40B4-BE49-F238E27FC236}">
+                <a16:creationId xmlns:a16="http://schemas.microsoft.com/office/drawing/2014/main" id="{6753252F-4873-4F63-801D-CC719279A7D5}"/>
+              </a:ext>
+              <a:ext uri="{C183D7F6-B498-43B3-948B-1728B52AA6E4}">
+                <adec:decorative xmlns:adec="http://schemas.microsoft.com/office/drawing/2017/decorative" val="1"/>
+              </a:ext>
+            </a:extLst>
+          </p:cNvPr>
+          <p:cNvSpPr>
+            <a:spLocks noGrp="1" noRot="1" noChangeAspect="1" noMove="1" noResize="1" noEditPoints="1" noAdjustHandles="1" noChangeArrowheads="1" noChangeShapeType="1" noTextEdit="1"/>
+          </p:cNvSpPr>
+          <p:nvPr>
+            <p:extLst>
+              <p:ext uri="{386F3935-93C4-4BCD-93E2-E3B085C9AB24}">
+                <p16:designElem xmlns:p16="http://schemas.microsoft.com/office/powerpoint/2015/main" val="1"/>
+              </p:ext>
+            </p:extLst>
+          </p:nvPr>
+        </p:nvSpPr>
+        <p:spPr>
+          <a:xfrm>
+            <a:off x="0" y="0"/>
+            <a:ext cx="12192000" cy="6858000"/>
+          </a:xfrm>
+          <a:prstGeom prst="rect">
+            <a:avLst/>
+          </a:prstGeom>
+          <a:solidFill>
+            <a:srgbClr val="FFFFFF"/>
+          </a:solidFill>
+          <a:ln>
+            <a:noFill/>
+          </a:ln>
+        </p:spPr>
+        <p:style>
+          <a:lnRef idx="2">
+            <a:schemeClr val="accent1">
+              <a:shade val="50000"/>
+            </a:schemeClr>
+          </a:lnRef>
+          <a:fillRef idx="1">
+            <a:schemeClr val="accent1"/>
+          </a:fillRef>
+          <a:effectRef idx="0">
+            <a:schemeClr val="accent1"/>
+          </a:effectRef>
+          <a:fontRef idx="minor">
+            <a:schemeClr val="lt1"/>
+          </a:fontRef>
+        </p:style>
+        <p:txBody>
+          <a:bodyPr rtlCol="0" anchor="ctr"/>
+          <a:lstStyle/>
+          <a:p>
+            <a:pPr algn="ctr"/>
+            <a:endParaRPr lang="en-US"/>
+          </a:p>
+        </p:txBody>
+      </p:sp>
+      <p:sp>
+        <p:nvSpPr>
+          <p:cNvPr id="17" name="Rectangle 16">
+            <a:extLst>
+              <a:ext uri="{FF2B5EF4-FFF2-40B4-BE49-F238E27FC236}">
+                <a16:creationId xmlns:a16="http://schemas.microsoft.com/office/drawing/2014/main" id="{047C8CCB-F95D-4249-92DD-651249D3535A}"/>
+              </a:ext>
+              <a:ext uri="{C183D7F6-B498-43B3-948B-1728B52AA6E4}">
+                <adec:decorative xmlns:adec="http://schemas.microsoft.com/office/drawing/2017/decorative" val="1"/>
+              </a:ext>
+            </a:extLst>
+          </p:cNvPr>
+          <p:cNvSpPr>
+            <a:spLocks noGrp="1" noRot="1" noChangeAspect="1" noMove="1" noResize="1" noEditPoints="1" noAdjustHandles="1" noChangeArrowheads="1" noChangeShapeType="1" noTextEdit="1"/>
+          </p:cNvSpPr>
+          <p:nvPr>
+            <p:extLst>
+              <p:ext uri="{386F3935-93C4-4BCD-93E2-E3B085C9AB24}">
+                <p16:designElem xmlns:p16="http://schemas.microsoft.com/office/powerpoint/2015/main" val="1"/>
+              </p:ext>
+            </p:extLst>
+          </p:nvPr>
+        </p:nvSpPr>
+        <p:spPr>
+          <a:xfrm>
+            <a:off x="0" y="0"/>
+            <a:ext cx="2013557" cy="6858000"/>
+          </a:xfrm>
+          <a:prstGeom prst="rect">
+            <a:avLst/>
+          </a:prstGeom>
+          <a:solidFill>
+            <a:srgbClr val="542C39"/>
+          </a:solidFill>
+          <a:ln>
+            <a:noFill/>
+          </a:ln>
+        </p:spPr>
+        <p:style>
+          <a:lnRef idx="2">
+            <a:schemeClr val="accent1">
+              <a:shade val="50000"/>
+            </a:schemeClr>
+          </a:lnRef>
+          <a:fillRef idx="1">
+            <a:schemeClr val="accent1"/>
+          </a:fillRef>
+          <a:effectRef idx="0">
+            <a:schemeClr val="accent1"/>
+          </a:effectRef>
+          <a:fontRef idx="minor">
+            <a:schemeClr val="lt1"/>
+          </a:fontRef>
+        </p:style>
+        <p:txBody>
+          <a:bodyPr rtlCol="0" anchor="ctr"/>
+          <a:lstStyle/>
+          <a:p>
+            <a:pPr algn="ctr"/>
+            <a:endParaRPr lang="en-US"/>
+          </a:p>
+        </p:txBody>
+      </p:sp>
+      <p:sp>
+        <p:nvSpPr>
+          <p:cNvPr id="23" name="Rectangle 22">
+            <a:extLst>
+              <a:ext uri="{FF2B5EF4-FFF2-40B4-BE49-F238E27FC236}">
+                <a16:creationId xmlns:a16="http://schemas.microsoft.com/office/drawing/2014/main" id="{28403A2A-F5B0-4C1E-92F8-F68B4185D272}"/>
+              </a:ext>
+            </a:extLst>
+          </p:cNvPr>
+          <p:cNvSpPr/>
+          <p:nvPr/>
+        </p:nvSpPr>
+        <p:spPr>
+          <a:xfrm>
+            <a:off x="2499360" y="6541462"/>
+            <a:ext cx="9666205" cy="316538"/>
+          </a:xfrm>
+          <a:prstGeom prst="rect">
+            <a:avLst/>
+          </a:prstGeom>
+          <a:solidFill>
+            <a:srgbClr val="7EA861"/>
+          </a:solidFill>
+          <a:ln>
+            <a:solidFill>
+              <a:srgbClr val="7EA861"/>
+            </a:solidFill>
+          </a:ln>
+        </p:spPr>
+        <p:style>
+          <a:lnRef idx="2">
+            <a:schemeClr val="accent1">
+              <a:shade val="50000"/>
+            </a:schemeClr>
+          </a:lnRef>
+          <a:fillRef idx="1">
+            <a:schemeClr val="accent1"/>
+          </a:fillRef>
+          <a:effectRef idx="0">
+            <a:schemeClr val="accent1"/>
+          </a:effectRef>
+          <a:fontRef idx="minor">
+            <a:schemeClr val="lt1"/>
+          </a:fontRef>
+        </p:style>
+        <p:txBody>
+          <a:bodyPr rtlCol="0" anchor="ctr"/>
+          <a:lstStyle/>
+          <a:p>
+            <a:pPr algn="ctr"/>
+            <a:endParaRPr lang="en-US"/>
+          </a:p>
+        </p:txBody>
+      </p:sp>
+      <p:sp>
+        <p:nvSpPr>
+          <p:cNvPr id="8" name="Subtitle 2">
+            <a:extLst>
+              <a:ext uri="{FF2B5EF4-FFF2-40B4-BE49-F238E27FC236}">
+                <a16:creationId xmlns:a16="http://schemas.microsoft.com/office/drawing/2014/main" id="{3FD876A2-3892-42BE-9CDA-650985982439}"/>
+              </a:ext>
+            </a:extLst>
+          </p:cNvPr>
+          <p:cNvSpPr txBox="1">
+            <a:spLocks/>
+          </p:cNvSpPr>
+          <p:nvPr/>
+        </p:nvSpPr>
+        <p:spPr>
+          <a:xfrm>
+            <a:off x="2831301" y="317586"/>
+            <a:ext cx="5354320" cy="838831"/>
+          </a:xfrm>
+          <a:prstGeom prst="rect">
+            <a:avLst/>
+          </a:prstGeom>
+        </p:spPr>
+        <p:txBody>
+          <a:bodyPr vert="horz" lIns="91440" tIns="45720" rIns="91440" bIns="45720" rtlCol="0" anchor="b">
+            <a:normAutofit/>
+          </a:bodyPr>
+          <a:lstStyle>
+            <a:lvl1pPr marL="0" indent="0" algn="l" defTabSz="914400" rtl="0" eaLnBrk="1" latinLnBrk="0" hangingPunct="1">
+              <a:lnSpc>
+                <a:spcPct val="90000"/>
+              </a:lnSpc>
+              <a:spcBef>
+                <a:spcPts val="1000"/>
+              </a:spcBef>
+              <a:buFont typeface="Arial" panose="020B0604020202020204" pitchFamily="34" charset="0"/>
+              <a:buNone/>
+              <a:defRPr sz="2400" b="1" kern="1200">
+                <a:solidFill>
+                  <a:schemeClr val="tx1"/>
+                </a:solidFill>
+                <a:latin typeface="+mn-lt"/>
+                <a:ea typeface="+mn-ea"/>
+                <a:cs typeface="+mn-cs"/>
+              </a:defRPr>
+            </a:lvl1pPr>
+            <a:lvl2pPr marL="457200" indent="0" algn="l" defTabSz="914400" rtl="0" eaLnBrk="1" latinLnBrk="0" hangingPunct="1">
+              <a:lnSpc>
+                <a:spcPct val="90000"/>
+              </a:lnSpc>
+              <a:spcBef>
+                <a:spcPts val="500"/>
+              </a:spcBef>
+              <a:buFont typeface="Arial" panose="020B0604020202020204" pitchFamily="34" charset="0"/>
+              <a:buNone/>
+              <a:defRPr sz="2000" b="1" kern="1200">
+                <a:solidFill>
+                  <a:schemeClr val="tx1"/>
+                </a:solidFill>
+                <a:latin typeface="+mn-lt"/>
+                <a:ea typeface="+mn-ea"/>
+                <a:cs typeface="+mn-cs"/>
+              </a:defRPr>
+            </a:lvl2pPr>
+            <a:lvl3pPr marL="914400" indent="0" algn="l" defTabSz="914400" rtl="0" eaLnBrk="1" latinLnBrk="0" hangingPunct="1">
+              <a:lnSpc>
+                <a:spcPct val="90000"/>
+              </a:lnSpc>
+              <a:spcBef>
+                <a:spcPts val="500"/>
+              </a:spcBef>
+              <a:buFont typeface="Arial" panose="020B0604020202020204" pitchFamily="34" charset="0"/>
+              <a:buNone/>
+              <a:defRPr sz="1800" b="1" kern="1200">
+                <a:solidFill>
+                  <a:schemeClr val="tx1"/>
+                </a:solidFill>
+                <a:latin typeface="+mn-lt"/>
+                <a:ea typeface="+mn-ea"/>
+                <a:cs typeface="+mn-cs"/>
+              </a:defRPr>
+            </a:lvl3pPr>
+            <a:lvl4pPr marL="1371600" indent="0" algn="l" defTabSz="914400" rtl="0" eaLnBrk="1" latinLnBrk="0" hangingPunct="1">
+              <a:lnSpc>
+                <a:spcPct val="90000"/>
+              </a:lnSpc>
+              <a:spcBef>
+                <a:spcPts val="500"/>
+              </a:spcBef>
+              <a:buFont typeface="Arial" panose="020B0604020202020204" pitchFamily="34" charset="0"/>
+              <a:buNone/>
+              <a:defRPr sz="1600" b="1" kern="1200">
+                <a:solidFill>
+                  <a:schemeClr val="tx1"/>
+                </a:solidFill>
+                <a:latin typeface="+mn-lt"/>
+                <a:ea typeface="+mn-ea"/>
+                <a:cs typeface="+mn-cs"/>
+              </a:defRPr>
+            </a:lvl4pPr>
+            <a:lvl5pPr marL="1828800" indent="0" algn="l" defTabSz="914400" rtl="0" eaLnBrk="1" latinLnBrk="0" hangingPunct="1">
+              <a:lnSpc>
+                <a:spcPct val="90000"/>
+              </a:lnSpc>
+              <a:spcBef>
+                <a:spcPts val="500"/>
+              </a:spcBef>
+              <a:buFont typeface="Arial" panose="020B0604020202020204" pitchFamily="34" charset="0"/>
+              <a:buNone/>
+              <a:defRPr sz="1600" b="1" kern="1200">
+                <a:solidFill>
+                  <a:schemeClr val="tx1"/>
+                </a:solidFill>
+                <a:latin typeface="+mn-lt"/>
+                <a:ea typeface="+mn-ea"/>
+                <a:cs typeface="+mn-cs"/>
+              </a:defRPr>
+            </a:lvl5pPr>
+            <a:lvl6pPr marL="2286000" indent="0" algn="l" defTabSz="914400" rtl="0" eaLnBrk="1" latinLnBrk="0" hangingPunct="1">
+              <a:lnSpc>
+                <a:spcPct val="90000"/>
+              </a:lnSpc>
+              <a:spcBef>
+                <a:spcPts val="500"/>
+              </a:spcBef>
+              <a:buFont typeface="Arial" panose="020B0604020202020204" pitchFamily="34" charset="0"/>
+              <a:buNone/>
+              <a:defRPr sz="1600" b="1" kern="1200">
+                <a:solidFill>
+                  <a:schemeClr val="tx1"/>
+                </a:solidFill>
+                <a:latin typeface="+mn-lt"/>
+                <a:ea typeface="+mn-ea"/>
+                <a:cs typeface="+mn-cs"/>
+              </a:defRPr>
+            </a:lvl6pPr>
+            <a:lvl7pPr marL="2743200" indent="0" algn="l" defTabSz="914400" rtl="0" eaLnBrk="1" latinLnBrk="0" hangingPunct="1">
+              <a:lnSpc>
+                <a:spcPct val="90000"/>
+              </a:lnSpc>
+              <a:spcBef>
+                <a:spcPts val="500"/>
+              </a:spcBef>
+              <a:buFont typeface="Arial" panose="020B0604020202020204" pitchFamily="34" charset="0"/>
+              <a:buNone/>
+              <a:defRPr sz="1600" b="1" kern="1200">
+                <a:solidFill>
+                  <a:schemeClr val="tx1"/>
+                </a:solidFill>
+                <a:latin typeface="+mn-lt"/>
+                <a:ea typeface="+mn-ea"/>
+                <a:cs typeface="+mn-cs"/>
+              </a:defRPr>
+            </a:lvl7pPr>
+            <a:lvl8pPr marL="3200400" indent="0" algn="l" defTabSz="914400" rtl="0" eaLnBrk="1" latinLnBrk="0" hangingPunct="1">
+              <a:lnSpc>
+                <a:spcPct val="90000"/>
+              </a:lnSpc>
+              <a:spcBef>
+                <a:spcPts val="500"/>
+              </a:spcBef>
+              <a:buFont typeface="Arial" panose="020B0604020202020204" pitchFamily="34" charset="0"/>
+              <a:buNone/>
+              <a:defRPr sz="1600" b="1" kern="1200">
+                <a:solidFill>
+                  <a:schemeClr val="tx1"/>
+                </a:solidFill>
+                <a:latin typeface="+mn-lt"/>
+                <a:ea typeface="+mn-ea"/>
+                <a:cs typeface="+mn-cs"/>
+              </a:defRPr>
+            </a:lvl8pPr>
+            <a:lvl9pPr marL="3657600" indent="0" algn="l" defTabSz="914400" rtl="0" eaLnBrk="1" latinLnBrk="0" hangingPunct="1">
+              <a:lnSpc>
+                <a:spcPct val="90000"/>
+              </a:lnSpc>
+              <a:spcBef>
+                <a:spcPts val="500"/>
+              </a:spcBef>
+              <a:buFont typeface="Arial" panose="020B0604020202020204" pitchFamily="34" charset="0"/>
+              <a:buNone/>
+              <a:defRPr sz="1600" b="1" kern="1200">
+                <a:solidFill>
+                  <a:schemeClr val="tx1"/>
+                </a:solidFill>
+                <a:latin typeface="+mn-lt"/>
+                <a:ea typeface="+mn-ea"/>
+                <a:cs typeface="+mn-cs"/>
+              </a:defRPr>
+            </a:lvl9pPr>
+          </a:lstStyle>
+          <a:p>
+            <a:pPr algn="r"/>
+            <a:endParaRPr lang="en-US" sz="5400" dirty="0">
+              <a:solidFill>
+                <a:srgbClr val="000000"/>
+              </a:solidFill>
+            </a:endParaRPr>
+          </a:p>
+        </p:txBody>
+      </p:sp>
+      <p:sp>
+        <p:nvSpPr>
+          <p:cNvPr id="12" name="Rectangle 11">
+            <a:extLst>
+              <a:ext uri="{FF2B5EF4-FFF2-40B4-BE49-F238E27FC236}">
+                <a16:creationId xmlns:a16="http://schemas.microsoft.com/office/drawing/2014/main" id="{667506F0-E964-4E08-93A1-B31E6BB62A25}"/>
+              </a:ext>
+            </a:extLst>
+          </p:cNvPr>
+          <p:cNvSpPr/>
+          <p:nvPr/>
+        </p:nvSpPr>
+        <p:spPr>
+          <a:xfrm>
+            <a:off x="1006777" y="0"/>
+            <a:ext cx="1830655" cy="6858000"/>
+          </a:xfrm>
+          <a:prstGeom prst="rect">
+            <a:avLst/>
+          </a:prstGeom>
+          <a:solidFill>
+            <a:srgbClr val="7EA861"/>
+          </a:solidFill>
+          <a:ln>
+            <a:solidFill>
+              <a:srgbClr val="7EA861"/>
+            </a:solidFill>
+          </a:ln>
+        </p:spPr>
+        <p:style>
+          <a:lnRef idx="2">
+            <a:schemeClr val="accent1">
+              <a:shade val="50000"/>
+            </a:schemeClr>
+          </a:lnRef>
+          <a:fillRef idx="1">
+            <a:schemeClr val="accent1"/>
+          </a:fillRef>
+          <a:effectRef idx="0">
+            <a:schemeClr val="accent1"/>
+          </a:effectRef>
+          <a:fontRef idx="minor">
+            <a:schemeClr val="lt1"/>
+          </a:fontRef>
+        </p:style>
+        <p:txBody>
+          <a:bodyPr rtlCol="0" anchor="ctr"/>
+          <a:lstStyle/>
+          <a:p>
+            <a:pPr algn="ctr"/>
+            <a:endParaRPr lang="en-US"/>
+          </a:p>
+        </p:txBody>
+      </p:sp>
+      <p:sp>
+        <p:nvSpPr>
+          <p:cNvPr id="11" name="Rectangle 10">
+            <a:extLst>
+              <a:ext uri="{FF2B5EF4-FFF2-40B4-BE49-F238E27FC236}">
+                <a16:creationId xmlns:a16="http://schemas.microsoft.com/office/drawing/2014/main" id="{8FF6D1F6-BE0D-405C-9028-EC70AF75D232}"/>
+              </a:ext>
+            </a:extLst>
+          </p:cNvPr>
+          <p:cNvSpPr/>
+          <p:nvPr/>
+        </p:nvSpPr>
+        <p:spPr>
+          <a:xfrm>
+            <a:off x="-1" y="0"/>
+            <a:ext cx="2013557" cy="6858000"/>
+          </a:xfrm>
+          <a:prstGeom prst="rect">
+            <a:avLst/>
+          </a:prstGeom>
+          <a:solidFill>
+            <a:srgbClr val="262626"/>
+          </a:solidFill>
+        </p:spPr>
+        <p:style>
+          <a:lnRef idx="2">
+            <a:schemeClr val="accent1">
+              <a:shade val="50000"/>
+            </a:schemeClr>
+          </a:lnRef>
+          <a:fillRef idx="1">
+            <a:schemeClr val="accent1"/>
+          </a:fillRef>
+          <a:effectRef idx="0">
+            <a:schemeClr val="accent1"/>
+          </a:effectRef>
+          <a:fontRef idx="minor">
+            <a:schemeClr val="lt1"/>
+          </a:fontRef>
+        </p:style>
+        <p:txBody>
+          <a:bodyPr rtlCol="0" anchor="ctr"/>
+          <a:lstStyle/>
+          <a:p>
+            <a:pPr algn="ctr"/>
+            <a:endParaRPr lang="en-US"/>
+          </a:p>
+        </p:txBody>
+      </p:sp>
+      <p:sp>
+        <p:nvSpPr>
+          <p:cNvPr id="14" name="Subtitle 2">
+            <a:extLst>
+              <a:ext uri="{FF2B5EF4-FFF2-40B4-BE49-F238E27FC236}">
+                <a16:creationId xmlns:a16="http://schemas.microsoft.com/office/drawing/2014/main" id="{7CAFED31-7BAB-4025-BC37-9E7CCE1DE47D}"/>
+              </a:ext>
+            </a:extLst>
+          </p:cNvPr>
+          <p:cNvSpPr txBox="1">
+            <a:spLocks/>
+          </p:cNvSpPr>
+          <p:nvPr/>
+        </p:nvSpPr>
+        <p:spPr>
+          <a:xfrm>
             <a:off x="2555432" y="248456"/>
             <a:ext cx="5909837" cy="597617"/>
           </a:xfrm>
@@ -9224,7 +10059,7 @@
 </p:sld>
 </file>
 
-<file path=ppt/slides/slide16.xml><?xml version="1.0" encoding="utf-8"?>
+<file path=ppt/slides/slide17.xml><?xml version="1.0" encoding="utf-8"?>
 <p:sld xmlns:a="http://schemas.openxmlformats.org/drawingml/2006/main" xmlns:r="http://schemas.openxmlformats.org/officeDocument/2006/relationships" xmlns:p="http://schemas.openxmlformats.org/presentationml/2006/main">
   <p:cSld>
     <p:bg>
@@ -13003,14 +13838,6 @@
 <file path=ppt/slides/slide6.xml><?xml version="1.0" encoding="utf-8"?>
 <p:sld xmlns:a="http://schemas.openxmlformats.org/drawingml/2006/main" xmlns:r="http://schemas.openxmlformats.org/officeDocument/2006/relationships" xmlns:p="http://schemas.openxmlformats.org/presentationml/2006/main">
   <p:cSld>
-    <p:bg>
-      <p:bgPr>
-        <a:solidFill>
-          <a:srgbClr val="542C39"/>
-        </a:solidFill>
-        <a:effectLst/>
-      </p:bgPr>
-    </p:bg>
     <p:spTree>
       <p:nvGrpSpPr>
         <p:cNvPr id="1" name=""/>
@@ -13025,69 +13852,6 @@
           <a:chExt cx="0" cy="0"/>
         </a:xfrm>
       </p:grpSpPr>
-      <p:sp>
-        <p:nvSpPr>
-          <p:cNvPr id="18" name="Rectangle 14">
-            <a:extLst>
-              <a:ext uri="{FF2B5EF4-FFF2-40B4-BE49-F238E27FC236}">
-                <a16:creationId xmlns:a16="http://schemas.microsoft.com/office/drawing/2014/main" id="{6753252F-4873-4F63-801D-CC719279A7D5}"/>
-              </a:ext>
-              <a:ext uri="{C183D7F6-B498-43B3-948B-1728B52AA6E4}">
-                <adec:decorative xmlns:adec="http://schemas.microsoft.com/office/drawing/2017/decorative" val="1"/>
-              </a:ext>
-            </a:extLst>
-          </p:cNvPr>
-          <p:cNvSpPr>
-            <a:spLocks noGrp="1" noRot="1" noChangeAspect="1" noMove="1" noResize="1" noEditPoints="1" noAdjustHandles="1" noChangeArrowheads="1" noChangeShapeType="1" noTextEdit="1"/>
-          </p:cNvSpPr>
-          <p:nvPr>
-            <p:extLst>
-              <p:ext uri="{386F3935-93C4-4BCD-93E2-E3B085C9AB24}">
-                <p16:designElem xmlns:p16="http://schemas.microsoft.com/office/powerpoint/2015/main" val="1"/>
-              </p:ext>
-            </p:extLst>
-          </p:nvPr>
-        </p:nvSpPr>
-        <p:spPr>
-          <a:xfrm>
-            <a:off x="0" y="0"/>
-            <a:ext cx="12192000" cy="6858000"/>
-          </a:xfrm>
-          <a:prstGeom prst="rect">
-            <a:avLst/>
-          </a:prstGeom>
-          <a:solidFill>
-            <a:srgbClr val="FFFFFF"/>
-          </a:solidFill>
-          <a:ln>
-            <a:noFill/>
-          </a:ln>
-        </p:spPr>
-        <p:style>
-          <a:lnRef idx="2">
-            <a:schemeClr val="accent1">
-              <a:shade val="50000"/>
-            </a:schemeClr>
-          </a:lnRef>
-          <a:fillRef idx="1">
-            <a:schemeClr val="accent1"/>
-          </a:fillRef>
-          <a:effectRef idx="0">
-            <a:schemeClr val="accent1"/>
-          </a:effectRef>
-          <a:fontRef idx="minor">
-            <a:schemeClr val="lt1"/>
-          </a:fontRef>
-        </p:style>
-        <p:txBody>
-          <a:bodyPr rtlCol="0" anchor="ctr"/>
-          <a:lstStyle/>
-          <a:p>
-            <a:pPr algn="ctr"/>
-            <a:endParaRPr lang="en-US"/>
-          </a:p>
-        </p:txBody>
-      </p:sp>
       <p:sp>
         <p:nvSpPr>
           <p:cNvPr id="14" name="Rectangle 13">
@@ -13144,69 +13908,6 @@
       </p:sp>
       <p:sp>
         <p:nvSpPr>
-          <p:cNvPr id="17" name="Rectangle 16">
-            <a:extLst>
-              <a:ext uri="{FF2B5EF4-FFF2-40B4-BE49-F238E27FC236}">
-                <a16:creationId xmlns:a16="http://schemas.microsoft.com/office/drawing/2014/main" id="{047C8CCB-F95D-4249-92DD-651249D3535A}"/>
-              </a:ext>
-              <a:ext uri="{C183D7F6-B498-43B3-948B-1728B52AA6E4}">
-                <adec:decorative xmlns:adec="http://schemas.microsoft.com/office/drawing/2017/decorative" val="1"/>
-              </a:ext>
-            </a:extLst>
-          </p:cNvPr>
-          <p:cNvSpPr>
-            <a:spLocks noGrp="1" noRot="1" noChangeAspect="1" noMove="1" noResize="1" noEditPoints="1" noAdjustHandles="1" noChangeArrowheads="1" noChangeShapeType="1" noTextEdit="1"/>
-          </p:cNvSpPr>
-          <p:nvPr>
-            <p:extLst>
-              <p:ext uri="{386F3935-93C4-4BCD-93E2-E3B085C9AB24}">
-                <p16:designElem xmlns:p16="http://schemas.microsoft.com/office/powerpoint/2015/main" val="1"/>
-              </p:ext>
-            </p:extLst>
-          </p:nvPr>
-        </p:nvSpPr>
-        <p:spPr>
-          <a:xfrm>
-            <a:off x="0" y="0"/>
-            <a:ext cx="2013557" cy="6858000"/>
-          </a:xfrm>
-          <a:prstGeom prst="rect">
-            <a:avLst/>
-          </a:prstGeom>
-          <a:solidFill>
-            <a:srgbClr val="542C39"/>
-          </a:solidFill>
-          <a:ln>
-            <a:noFill/>
-          </a:ln>
-        </p:spPr>
-        <p:style>
-          <a:lnRef idx="2">
-            <a:schemeClr val="accent1">
-              <a:shade val="50000"/>
-            </a:schemeClr>
-          </a:lnRef>
-          <a:fillRef idx="1">
-            <a:schemeClr val="accent1"/>
-          </a:fillRef>
-          <a:effectRef idx="0">
-            <a:schemeClr val="accent1"/>
-          </a:effectRef>
-          <a:fontRef idx="minor">
-            <a:schemeClr val="lt1"/>
-          </a:fontRef>
-        </p:style>
-        <p:txBody>
-          <a:bodyPr rtlCol="0" anchor="ctr"/>
-          <a:lstStyle/>
-          <a:p>
-            <a:pPr algn="ctr"/>
-            <a:endParaRPr lang="en-US"/>
-          </a:p>
-        </p:txBody>
-      </p:sp>
-      <p:sp>
-        <p:nvSpPr>
           <p:cNvPr id="11" name="Rectangle 10">
             <a:extLst>
               <a:ext uri="{FF2B5EF4-FFF2-40B4-BE49-F238E27FC236}">
@@ -13336,7 +14037,7 @@
         </p:blipFill>
         <p:spPr>
           <a:xfrm>
-            <a:off x="2968316" y="1691857"/>
+            <a:off x="3302411" y="4559917"/>
             <a:ext cx="3457884" cy="1258669"/>
           </a:xfrm>
           <a:prstGeom prst="rect">
@@ -13358,7 +14059,7 @@
         </p:nvSpPr>
         <p:spPr>
           <a:xfrm>
-            <a:off x="3127107" y="3066549"/>
+            <a:off x="3425890" y="3482699"/>
             <a:ext cx="3669957" cy="1077218"/>
           </a:xfrm>
           <a:prstGeom prst="rect">
@@ -13448,7 +14149,7 @@
         </p:nvSpPr>
         <p:spPr>
           <a:xfrm>
-            <a:off x="2499360" y="837717"/>
+            <a:off x="2979535" y="521395"/>
             <a:ext cx="2867688" cy="695557"/>
           </a:xfrm>
           <a:prstGeom prst="rect">
@@ -13626,14 +14327,15 @@
           <a:p>
             <a:pPr algn="r"/>
             <a:r>
-              <a:rPr lang="en-US" sz="2200" dirty="0"/>
+              <a:rPr lang="en-US" sz="2200" dirty="0">
+                <a:solidFill>
+                  <a:schemeClr val="accent6">
+                    <a:lumMod val="75000"/>
+                  </a:schemeClr>
+                </a:solidFill>
+              </a:rPr>
               <a:t>The Gini Coefficient</a:t>
             </a:r>
-            <a:endParaRPr lang="en-US" sz="2200" dirty="0">
-              <a:solidFill>
-                <a:srgbClr val="000000"/>
-              </a:solidFill>
-            </a:endParaRPr>
           </a:p>
         </p:txBody>
       </p:sp>
@@ -13651,7 +14353,7 @@
         </p:nvSpPr>
         <p:spPr>
           <a:xfrm>
-            <a:off x="3127107" y="4173515"/>
+            <a:off x="3892207" y="1249234"/>
             <a:ext cx="3954560" cy="2031325"/>
           </a:xfrm>
           <a:prstGeom prst="rect">
@@ -13777,7 +14479,7 @@
     </p:spTree>
     <p:extLst>
       <p:ext uri="{BB962C8B-B14F-4D97-AF65-F5344CB8AC3E}">
-        <p14:creationId xmlns:p14="http://schemas.microsoft.com/office/powerpoint/2010/main" val="1999621410"/>
+        <p14:creationId xmlns:p14="http://schemas.microsoft.com/office/powerpoint/2010/main" val="1859999036"/>
       </p:ext>
     </p:extLst>
   </p:cSld>

</xml_diff>